<commit_message>
Try to look for female composers
Not trivial to match names - need exact match?
</commit_message>
<xml_diff>
--- a/interview_pitch.pptx
+++ b/interview_pitch.pptx
@@ -4844,7 +4844,7 @@
         </p:blipFill>
         <p:spPr>
           <a:xfrm>
-            <a:off x="8128566" y="1833730"/>
+            <a:off x="8128566" y="1155931"/>
             <a:ext cx="3915819" cy="2836914"/>
           </a:xfrm>
           <a:prstGeom prst="rect">
@@ -4874,7 +4874,7 @@
         </p:blipFill>
         <p:spPr>
           <a:xfrm>
-            <a:off x="3994714" y="1846425"/>
+            <a:off x="3994714" y="1168626"/>
             <a:ext cx="3869971" cy="2803699"/>
           </a:xfrm>
           <a:prstGeom prst="rect">
@@ -4882,37 +4882,6 @@
           </a:prstGeom>
         </p:spPr>
       </p:pic>
-      <p:sp>
-        <p:nvSpPr>
-          <p:cNvPr id="2" name="Title 1">
-            <a:extLst>
-              <a:ext uri="{FF2B5EF4-FFF2-40B4-BE49-F238E27FC236}">
-                <a16:creationId xmlns:a16="http://schemas.microsoft.com/office/drawing/2014/main" id="{A3503EF7-81F3-4A61-9534-47923E689F02}"/>
-              </a:ext>
-            </a:extLst>
-          </p:cNvPr>
-          <p:cNvSpPr>
-            <a:spLocks noGrp="1"/>
-          </p:cNvSpPr>
-          <p:nvPr>
-            <p:ph type="title"/>
-          </p:nvPr>
-        </p:nvSpPr>
-        <p:spPr/>
-        <p:txBody>
-          <a:bodyPr>
-            <a:normAutofit/>
-          </a:bodyPr>
-          <a:lstStyle/>
-          <a:p>
-            <a:pPr algn="ctr"/>
-            <a:r>
-              <a:rPr lang="en-US" sz="3600" dirty="0"/>
-              <a:t>Exploring composer representation over time</a:t>
-            </a:r>
-          </a:p>
-        </p:txBody>
-      </p:sp>
       <p:sp>
         <p:nvSpPr>
           <p:cNvPr id="13" name="Footer Placeholder 4">
@@ -4974,7 +4943,7 @@
         </p:nvGrpSpPr>
         <p:grpSpPr>
           <a:xfrm>
-            <a:off x="4351345" y="1109979"/>
+            <a:off x="4351345" y="432180"/>
             <a:ext cx="3392424" cy="3088458"/>
             <a:chOff x="7447127" y="691518"/>
             <a:chExt cx="3392424" cy="3088458"/>
@@ -5128,7 +5097,7 @@
         </p:blipFill>
         <p:spPr>
           <a:xfrm>
-            <a:off x="123099" y="1911417"/>
+            <a:off x="123099" y="1233618"/>
             <a:ext cx="3547433" cy="2687839"/>
           </a:xfrm>
           <a:prstGeom prst="rect">
@@ -5150,7 +5119,7 @@
         </p:nvSpPr>
         <p:spPr>
           <a:xfrm>
-            <a:off x="163231" y="1233461"/>
+            <a:off x="163231" y="555662"/>
             <a:ext cx="3467168" cy="369332"/>
           </a:xfrm>
           <a:prstGeom prst="rect">
@@ -5185,8 +5154,8 @@
         </p:nvSpPr>
         <p:spPr>
           <a:xfrm>
-            <a:off x="9022574" y="2025053"/>
-            <a:ext cx="1020664" cy="307777"/>
+            <a:off x="9246180" y="1371079"/>
+            <a:ext cx="840295" cy="261610"/>
           </a:xfrm>
           <a:prstGeom prst="rect">
             <a:avLst/>
@@ -5200,7 +5169,7 @@
           <a:lstStyle/>
           <a:p>
             <a:r>
-              <a:rPr lang="en-US" sz="1400" dirty="0">
+              <a:rPr lang="en-US" sz="1100" dirty="0">
                 <a:solidFill>
                   <a:schemeClr val="bg1"/>
                 </a:solidFill>
@@ -5224,7 +5193,7 @@
         </p:nvSpPr>
         <p:spPr>
           <a:xfrm>
-            <a:off x="10043238" y="2048878"/>
+            <a:off x="10043238" y="1371079"/>
             <a:ext cx="662117" cy="261610"/>
           </a:xfrm>
           <a:prstGeom prst="rect">
@@ -5266,7 +5235,7 @@
         </p:nvSpPr>
         <p:spPr>
           <a:xfrm>
-            <a:off x="11172681" y="2048137"/>
+            <a:off x="11172681" y="1370338"/>
             <a:ext cx="662117" cy="261610"/>
           </a:xfrm>
           <a:prstGeom prst="rect">
@@ -5308,7 +5277,7 @@
         </p:nvSpPr>
         <p:spPr>
           <a:xfrm>
-            <a:off x="8338178" y="1111974"/>
+            <a:off x="8338178" y="434175"/>
             <a:ext cx="3496620" cy="646331"/>
           </a:xfrm>
           <a:prstGeom prst="rect">
@@ -5344,7 +5313,7 @@
         </p:nvSpPr>
         <p:spPr>
           <a:xfrm rot="5400000">
-            <a:off x="1936482" y="3538955"/>
+            <a:off x="1936482" y="2861156"/>
             <a:ext cx="365125" cy="3102974"/>
           </a:xfrm>
           <a:prstGeom prst="rightBrace">
@@ -5395,7 +5364,7 @@
         </p:nvSpPr>
         <p:spPr>
           <a:xfrm>
-            <a:off x="1019504" y="5451300"/>
+            <a:off x="1019504" y="4796908"/>
             <a:ext cx="2199320" cy="369332"/>
           </a:xfrm>
           <a:prstGeom prst="rect">
@@ -5418,10 +5387,10 @@
       </p:sp>
       <p:sp>
         <p:nvSpPr>
-          <p:cNvPr id="63" name="TextBox 62">
+          <p:cNvPr id="1025" name="TextBox 1024">
             <a:extLst>
               <a:ext uri="{FF2B5EF4-FFF2-40B4-BE49-F238E27FC236}">
-                <a16:creationId xmlns:a16="http://schemas.microsoft.com/office/drawing/2014/main" id="{ED320D78-62CD-4CD7-9E73-FC2A4868D618}"/>
+                <a16:creationId xmlns:a16="http://schemas.microsoft.com/office/drawing/2014/main" id="{2E7F6AEE-7F39-44BB-B4D5-9A532311F2EF}"/>
               </a:ext>
             </a:extLst>
           </p:cNvPr>
@@ -5430,8 +5399,8 @@
         </p:nvSpPr>
         <p:spPr>
           <a:xfrm>
-            <a:off x="4267200" y="5090442"/>
-            <a:ext cx="6714915" cy="369332"/>
+            <a:off x="4989881" y="4385181"/>
+            <a:ext cx="6003695" cy="369332"/>
           </a:xfrm>
           <a:prstGeom prst="rect">
             <a:avLst/>
@@ -5444,17 +5413,437 @@
           </a:bodyPr>
           <a:lstStyle/>
           <a:p>
-            <a:r>
-              <a:rPr lang="en-US"/>
-              <a:t>Percentage of performances by the  </a:t>
+            <a:pPr algn="ctr"/>
+            <a:r>
+              <a:rPr lang="en-US" u="sng" dirty="0"/>
+              <a:t>Most</a:t>
             </a:r>
             <a:r>
               <a:rPr lang="en-US" dirty="0"/>
-              <a:t>number of performances by the </a:t>
-            </a:r>
-          </a:p>
-        </p:txBody>
-      </p:sp>
+              <a:t> frequently performed composers from minority groups</a:t>
+            </a:r>
+          </a:p>
+        </p:txBody>
+      </p:sp>
+      <p:graphicFrame>
+        <p:nvGraphicFramePr>
+          <p:cNvPr id="1027" name="Table 1027">
+            <a:extLst>
+              <a:ext uri="{FF2B5EF4-FFF2-40B4-BE49-F238E27FC236}">
+                <a16:creationId xmlns:a16="http://schemas.microsoft.com/office/drawing/2014/main" id="{D3EA8F88-F5A3-454B-9773-3ABFD77D1317}"/>
+              </a:ext>
+            </a:extLst>
+          </p:cNvPr>
+          <p:cNvGraphicFramePr>
+            <a:graphicFrameLocks noGrp="1"/>
+          </p:cNvGraphicFramePr>
+          <p:nvPr>
+            <p:extLst>
+              <p:ext uri="{D42A27DB-BD31-4B8C-83A1-F6EECF244321}">
+                <p14:modId xmlns:p14="http://schemas.microsoft.com/office/powerpoint/2010/main" val="1931183728"/>
+              </p:ext>
+            </p:extLst>
+          </p:nvPr>
+        </p:nvGraphicFramePr>
+        <p:xfrm>
+          <a:off x="4642373" y="4855045"/>
+          <a:ext cx="6698712" cy="1432560"/>
+        </p:xfrm>
+        <a:graphic>
+          <a:graphicData uri="http://schemas.openxmlformats.org/drawingml/2006/table">
+            <a:tbl>
+              <a:tblPr firstRow="1">
+                <a:tableStyleId>{5C22544A-7EE6-4342-B048-85BDC9FD1C3A}</a:tableStyleId>
+              </a:tblPr>
+              <a:tblGrid>
+                <a:gridCol w="1674678">
+                  <a:extLst>
+                    <a:ext uri="{9D8B030D-6E8A-4147-A177-3AD203B41FA5}">
+                      <a16:colId xmlns:a16="http://schemas.microsoft.com/office/drawing/2014/main" val="1041729631"/>
+                    </a:ext>
+                  </a:extLst>
+                </a:gridCol>
+                <a:gridCol w="1674678">
+                  <a:extLst>
+                    <a:ext uri="{9D8B030D-6E8A-4147-A177-3AD203B41FA5}">
+                      <a16:colId xmlns:a16="http://schemas.microsoft.com/office/drawing/2014/main" val="380840730"/>
+                    </a:ext>
+                  </a:extLst>
+                </a:gridCol>
+                <a:gridCol w="1674678">
+                  <a:extLst>
+                    <a:ext uri="{9D8B030D-6E8A-4147-A177-3AD203B41FA5}">
+                      <a16:colId xmlns:a16="http://schemas.microsoft.com/office/drawing/2014/main" val="2056326900"/>
+                    </a:ext>
+                  </a:extLst>
+                </a:gridCol>
+                <a:gridCol w="1674678">
+                  <a:extLst>
+                    <a:ext uri="{9D8B030D-6E8A-4147-A177-3AD203B41FA5}">
+                      <a16:colId xmlns:a16="http://schemas.microsoft.com/office/drawing/2014/main" val="3827903574"/>
+                    </a:ext>
+                  </a:extLst>
+                </a:gridCol>
+              </a:tblGrid>
+              <a:tr h="440738">
+                <a:tc>
+                  <a:txBody>
+                    <a:bodyPr/>
+                    <a:lstStyle/>
+                    <a:p>
+                      <a:pPr algn="ctr"/>
+                      <a:endParaRPr lang="en-US" sz="1400" dirty="0"/>
+                    </a:p>
+                  </a:txBody>
+                  <a:tcPr>
+                    <a:noFill/>
+                  </a:tcPr>
+                </a:tc>
+                <a:tc>
+                  <a:txBody>
+                    <a:bodyPr/>
+                    <a:lstStyle/>
+                    <a:p>
+                      <a:pPr algn="ctr"/>
+                      <a:r>
+                        <a:rPr lang="en-US" sz="1400" dirty="0"/>
+                        <a:t>Composer</a:t>
+                      </a:r>
+                    </a:p>
+                  </a:txBody>
+                  <a:tcPr>
+                    <a:noFill/>
+                  </a:tcPr>
+                </a:tc>
+                <a:tc>
+                  <a:txBody>
+                    <a:bodyPr/>
+                    <a:lstStyle/>
+                    <a:p>
+                      <a:pPr algn="ctr"/>
+                      <a:r>
+                        <a:rPr lang="en-US" sz="1400" dirty="0"/>
+                        <a:t>Overall ranking</a:t>
+                      </a:r>
+                    </a:p>
+                  </a:txBody>
+                  <a:tcPr>
+                    <a:noFill/>
+                  </a:tcPr>
+                </a:tc>
+                <a:tc>
+                  <a:txBody>
+                    <a:bodyPr/>
+                    <a:lstStyle/>
+                    <a:p>
+                      <a:pPr algn="ctr"/>
+                      <a:r>
+                        <a:rPr lang="en-US" sz="1400" dirty="0"/>
+                        <a:t>Number of performances</a:t>
+                      </a:r>
+                    </a:p>
+                  </a:txBody>
+                  <a:tcPr>
+                    <a:noFill/>
+                  </a:tcPr>
+                </a:tc>
+                <a:extLst>
+                  <a:ext uri="{0D108BD9-81ED-4DB2-BD59-A6C34878D82A}">
+                    <a16:rowId xmlns:a16="http://schemas.microsoft.com/office/drawing/2014/main" val="3284225454"/>
+                  </a:ext>
+                </a:extLst>
+              </a:tr>
+              <a:tr h="293722">
+                <a:tc>
+                  <a:txBody>
+                    <a:bodyPr/>
+                    <a:lstStyle/>
+                    <a:p>
+                      <a:pPr algn="ctr"/>
+                      <a:r>
+                        <a:rPr lang="en-US" sz="1400" dirty="0">
+                          <a:solidFill>
+                            <a:schemeClr val="tx1"/>
+                          </a:solidFill>
+                        </a:rPr>
+                        <a:t>Hispanic</a:t>
+                      </a:r>
+                    </a:p>
+                  </a:txBody>
+                  <a:tcPr>
+                    <a:noFill/>
+                  </a:tcPr>
+                </a:tc>
+                <a:tc>
+                  <a:txBody>
+                    <a:bodyPr/>
+                    <a:lstStyle/>
+                    <a:p>
+                      <a:pPr algn="ctr"/>
+                      <a:r>
+                        <a:rPr lang="en-US" sz="1400" dirty="0">
+                          <a:solidFill>
+                            <a:schemeClr val="tx1"/>
+                          </a:solidFill>
+                        </a:rPr>
+                        <a:t>Manuel de </a:t>
+                      </a:r>
+                      <a:r>
+                        <a:rPr lang="en-US" sz="1400" dirty="0" err="1">
+                          <a:solidFill>
+                            <a:schemeClr val="tx1"/>
+                          </a:solidFill>
+                        </a:rPr>
+                        <a:t>Falla</a:t>
+                      </a:r>
+                      <a:endParaRPr lang="en-US" sz="1400" dirty="0">
+                        <a:solidFill>
+                          <a:schemeClr val="tx1"/>
+                        </a:solidFill>
+                      </a:endParaRPr>
+                    </a:p>
+                  </a:txBody>
+                  <a:tcPr>
+                    <a:noFill/>
+                  </a:tcPr>
+                </a:tc>
+                <a:tc>
+                  <a:txBody>
+                    <a:bodyPr/>
+                    <a:lstStyle/>
+                    <a:p>
+                      <a:pPr algn="ctr"/>
+                      <a:r>
+                        <a:rPr lang="en-US" sz="1400" dirty="0">
+                          <a:solidFill>
+                            <a:schemeClr val="tx1"/>
+                          </a:solidFill>
+                        </a:rPr>
+                        <a:t>40</a:t>
+                      </a:r>
+                    </a:p>
+                  </a:txBody>
+                  <a:tcPr>
+                    <a:noFill/>
+                  </a:tcPr>
+                </a:tc>
+                <a:tc>
+                  <a:txBody>
+                    <a:bodyPr/>
+                    <a:lstStyle/>
+                    <a:p>
+                      <a:pPr algn="ctr"/>
+                      <a:r>
+                        <a:rPr lang="en-US" sz="1400" dirty="0">
+                          <a:solidFill>
+                            <a:schemeClr val="tx1"/>
+                          </a:solidFill>
+                        </a:rPr>
+                        <a:t>395</a:t>
+                      </a:r>
+                    </a:p>
+                  </a:txBody>
+                  <a:tcPr>
+                    <a:noFill/>
+                  </a:tcPr>
+                </a:tc>
+                <a:extLst>
+                  <a:ext uri="{0D108BD9-81ED-4DB2-BD59-A6C34878D82A}">
+                    <a16:rowId xmlns:a16="http://schemas.microsoft.com/office/drawing/2014/main" val="2908014864"/>
+                  </a:ext>
+                </a:extLst>
+              </a:tr>
+              <a:tr h="293722">
+                <a:tc>
+                  <a:txBody>
+                    <a:bodyPr/>
+                    <a:lstStyle/>
+                    <a:p>
+                      <a:pPr algn="ctr"/>
+                      <a:r>
+                        <a:rPr lang="en-US" sz="1400" dirty="0">
+                          <a:solidFill>
+                            <a:schemeClr val="tx1"/>
+                          </a:solidFill>
+                        </a:rPr>
+                        <a:t>Black</a:t>
+                      </a:r>
+                    </a:p>
+                  </a:txBody>
+                  <a:tcPr>
+                    <a:noFill/>
+                  </a:tcPr>
+                </a:tc>
+                <a:tc>
+                  <a:txBody>
+                    <a:bodyPr/>
+                    <a:lstStyle/>
+                    <a:p>
+                      <a:pPr algn="ctr"/>
+                      <a:r>
+                        <a:rPr lang="en-US" sz="1400" dirty="0">
+                          <a:solidFill>
+                            <a:schemeClr val="tx1"/>
+                          </a:solidFill>
+                        </a:rPr>
+                        <a:t>Duke Ellington</a:t>
+                      </a:r>
+                    </a:p>
+                  </a:txBody>
+                  <a:tcPr>
+                    <a:noFill/>
+                  </a:tcPr>
+                </a:tc>
+                <a:tc>
+                  <a:txBody>
+                    <a:bodyPr/>
+                    <a:lstStyle/>
+                    <a:p>
+                      <a:pPr algn="ctr"/>
+                      <a:r>
+                        <a:rPr lang="en-US" sz="1400" dirty="0">
+                          <a:solidFill>
+                            <a:schemeClr val="tx1"/>
+                          </a:solidFill>
+                        </a:rPr>
+                        <a:t>83</a:t>
+                      </a:r>
+                    </a:p>
+                  </a:txBody>
+                  <a:tcPr>
+                    <a:noFill/>
+                  </a:tcPr>
+                </a:tc>
+                <a:tc>
+                  <a:txBody>
+                    <a:bodyPr/>
+                    <a:lstStyle/>
+                    <a:p>
+                      <a:pPr algn="ctr"/>
+                      <a:r>
+                        <a:rPr lang="en-US" sz="1400" dirty="0">
+                          <a:solidFill>
+                            <a:schemeClr val="tx1"/>
+                          </a:solidFill>
+                        </a:rPr>
+                        <a:t>103</a:t>
+                      </a:r>
+                    </a:p>
+                  </a:txBody>
+                  <a:tcPr>
+                    <a:noFill/>
+                  </a:tcPr>
+                </a:tc>
+                <a:extLst>
+                  <a:ext uri="{0D108BD9-81ED-4DB2-BD59-A6C34878D82A}">
+                    <a16:rowId xmlns:a16="http://schemas.microsoft.com/office/drawing/2014/main" val="757332057"/>
+                  </a:ext>
+                </a:extLst>
+              </a:tr>
+              <a:tr h="293722">
+                <a:tc>
+                  <a:txBody>
+                    <a:bodyPr/>
+                    <a:lstStyle/>
+                    <a:p>
+                      <a:pPr algn="ctr"/>
+                      <a:r>
+                        <a:rPr lang="en-US" sz="1400" dirty="0">
+                          <a:solidFill>
+                            <a:schemeClr val="tx1"/>
+                          </a:solidFill>
+                        </a:rPr>
+                        <a:t>Female</a:t>
+                      </a:r>
+                    </a:p>
+                  </a:txBody>
+                  <a:tcPr>
+                    <a:noFill/>
+                  </a:tcPr>
+                </a:tc>
+                <a:tc>
+                  <a:txBody>
+                    <a:bodyPr/>
+                    <a:lstStyle/>
+                    <a:p>
+                      <a:pPr algn="ctr"/>
+                      <a:r>
+                        <a:rPr lang="en-US" sz="1400" dirty="0">
+                          <a:solidFill>
+                            <a:schemeClr val="tx1"/>
+                          </a:solidFill>
+                        </a:rPr>
+                        <a:t>Sofia </a:t>
+                      </a:r>
+                      <a:r>
+                        <a:rPr lang="en-US" sz="1400" dirty="0" err="1">
+                          <a:solidFill>
+                            <a:schemeClr val="tx1"/>
+                          </a:solidFill>
+                        </a:rPr>
+                        <a:t>Gubaidulina</a:t>
+                      </a:r>
+                      <a:endParaRPr lang="en-US" sz="1400" dirty="0">
+                        <a:solidFill>
+                          <a:schemeClr val="tx1"/>
+                        </a:solidFill>
+                      </a:endParaRPr>
+                    </a:p>
+                  </a:txBody>
+                  <a:tcPr>
+                    <a:noFill/>
+                  </a:tcPr>
+                </a:tc>
+                <a:tc>
+                  <a:txBody>
+                    <a:bodyPr/>
+                    <a:lstStyle/>
+                    <a:p>
+                      <a:pPr algn="ctr"/>
+                      <a:r>
+                        <a:rPr lang="en-US" sz="1400" dirty="0">
+                          <a:solidFill>
+                            <a:schemeClr val="tx1"/>
+                          </a:solidFill>
+                        </a:rPr>
+                        <a:t>183</a:t>
+                      </a:r>
+                    </a:p>
+                  </a:txBody>
+                  <a:tcPr>
+                    <a:noFill/>
+                  </a:tcPr>
+                </a:tc>
+                <a:tc>
+                  <a:txBody>
+                    <a:bodyPr/>
+                    <a:lstStyle/>
+                    <a:p>
+                      <a:pPr algn="ctr"/>
+                      <a:r>
+                        <a:rPr lang="en-US" sz="1400" dirty="0">
+                          <a:solidFill>
+                            <a:schemeClr val="tx1"/>
+                          </a:solidFill>
+                        </a:rPr>
+                        <a:t>35</a:t>
+                      </a:r>
+                    </a:p>
+                  </a:txBody>
+                  <a:tcPr>
+                    <a:noFill/>
+                  </a:tcPr>
+                </a:tc>
+                <a:extLst>
+                  <a:ext uri="{0D108BD9-81ED-4DB2-BD59-A6C34878D82A}">
+                    <a16:rowId xmlns:a16="http://schemas.microsoft.com/office/drawing/2014/main" val="1746248744"/>
+                  </a:ext>
+                </a:extLst>
+              </a:tr>
+            </a:tbl>
+          </a:graphicData>
+        </a:graphic>
+      </p:graphicFrame>
     </p:spTree>
     <p:extLst>
       <p:ext uri="{BB962C8B-B14F-4D97-AF65-F5344CB8AC3E}">
@@ -5511,53 +5900,7 @@
             <a:pPr algn="ctr"/>
             <a:r>
               <a:rPr lang="en-US" sz="3600" dirty="0"/>
-              <a:t>What can we learn from this dataset?</a:t>
-            </a:r>
-          </a:p>
-        </p:txBody>
-      </p:sp>
-      <p:sp>
-        <p:nvSpPr>
-          <p:cNvPr id="7" name="Rectangle 6">
-            <a:extLst>
-              <a:ext uri="{FF2B5EF4-FFF2-40B4-BE49-F238E27FC236}">
-                <a16:creationId xmlns:a16="http://schemas.microsoft.com/office/drawing/2014/main" id="{9DBF9900-0BFF-4BE1-AC12-4A971133B2A6}"/>
-              </a:ext>
-            </a:extLst>
-          </p:cNvPr>
-          <p:cNvSpPr/>
-          <p:nvPr/>
-        </p:nvSpPr>
-        <p:spPr>
-          <a:xfrm>
-            <a:off x="1301494" y="1408927"/>
-            <a:ext cx="3718982" cy="1323439"/>
-          </a:xfrm>
-          <a:prstGeom prst="rect">
-            <a:avLst/>
-          </a:prstGeom>
-        </p:spPr>
-        <p:txBody>
-          <a:bodyPr wrap="square">
-            <a:spAutoFit/>
-          </a:bodyPr>
-          <a:lstStyle/>
-          <a:p>
-            <a:pPr algn="ctr"/>
-            <a:r>
-              <a:rPr lang="en-US" sz="1600" dirty="0"/>
-              <a:t>How has the representation of composers changed over time?</a:t>
-            </a:r>
-          </a:p>
-          <a:p>
-            <a:pPr algn="ctr"/>
-            <a:endParaRPr lang="en-US" sz="1600" dirty="0"/>
-          </a:p>
-          <a:p>
-            <a:pPr algn="ctr"/>
-            <a:r>
-              <a:rPr lang="en-US" sz="1600" dirty="0"/>
-              <a:t>Do certain conductors prefer to perform the works of certain composers?</a:t>
+              <a:t>Can the orchestra program more adventurous repertoire?</a:t>
             </a:r>
           </a:p>
         </p:txBody>
@@ -5576,7 +5919,7 @@
         </p:nvSpPr>
         <p:spPr>
           <a:xfrm>
-            <a:off x="7318811" y="1485872"/>
+            <a:off x="1758839" y="1201843"/>
             <a:ext cx="3718982" cy="584775"/>
           </a:xfrm>
           <a:prstGeom prst="rect">

</xml_diff>